<commit_message>
Docs: regenerate diagrams, add split OnWmap level2 (config/product), update decks, add thumbnails and docs/.gitignore; archive backups/errors; remove old combined OnWmap
</commit_message>
<xml_diff>
--- a/docs/ERT_presentation.pptx
+++ b/docs/ERT_presentation.pptx
@@ -20,6 +20,8 @@
     <p:sldId id="268" r:id="rId19"/>
     <p:sldId id="269" r:id="rId20"/>
     <p:sldId id="270" r:id="rId21"/>
+    <p:sldId id="271" r:id="rId22"/>
+    <p:sldId id="272" r:id="rId23"/>
   </p:sldIdLst>
   <p:sldSz cx="9144000" cy="6858000" type="screen4x3"/>
   <p:notesSz cx="6858000" cy="9144000"/>
@@ -3183,34 +3185,30 @@
           </a:p>
         </p:txBody>
       </p:sp>
-      <p:sp>
-        <p:nvSpPr>
-          <p:cNvPr id="3" name="TextBox 2"/>
-          <p:cNvSpPr txBox="1"/>
+      <p:pic>
+        <p:nvPicPr>
+          <p:cNvPr id="3" name="Picture 2" descr="ert-overview.png"/>
+          <p:cNvPicPr>
+            <a:picLocks noChangeAspect="1"/>
+          </p:cNvPicPr>
           <p:nvPr/>
-        </p:nvSpPr>
+        </p:nvPicPr>
+        <p:blipFill>
+          <a:blip r:embed="rId2"/>
+          <a:stretch>
+            <a:fillRect/>
+          </a:stretch>
+        </p:blipFill>
         <p:spPr>
           <a:xfrm>
             <a:off x="457200" y="1097280"/>
-            <a:ext cx="8229600" cy="914400"/>
+            <a:ext cx="8229600" cy="12895632"/>
           </a:xfrm>
           <a:prstGeom prst="rect">
             <a:avLst/>
           </a:prstGeom>
-          <a:noFill/>
         </p:spPr>
-        <p:txBody>
-          <a:bodyPr wrap="none">
-            <a:spAutoFit/>
-          </a:bodyPr>
-          <a:lstStyle/>
-          <a:p>
-            <a:r>
-              <a:t>[Could not render image: ert-overview.png]</a:t>
-            </a:r>
-          </a:p>
-        </p:txBody>
-      </p:sp>
+      </p:pic>
     </p:spTree>
   </p:cSld>
   <p:clrMapOvr>
@@ -3250,34 +3248,30 @@
           </a:p>
         </p:txBody>
       </p:sp>
-      <p:sp>
-        <p:nvSpPr>
-          <p:cNvPr id="3" name="TextBox 2"/>
-          <p:cNvSpPr txBox="1"/>
+      <p:pic>
+        <p:nvPicPr>
+          <p:cNvPr id="3" name="Picture 2" descr="onlot-dataflow.png"/>
+          <p:cNvPicPr>
+            <a:picLocks noChangeAspect="1"/>
+          </p:cNvPicPr>
           <p:nvPr/>
-        </p:nvSpPr>
+        </p:nvPicPr>
+        <p:blipFill>
+          <a:blip r:embed="rId2"/>
+          <a:stretch>
+            <a:fillRect/>
+          </a:stretch>
+        </p:blipFill>
         <p:spPr>
           <a:xfrm>
             <a:off x="457200" y="1097280"/>
-            <a:ext cx="8229600" cy="914400"/>
+            <a:ext cx="8229600" cy="6337772"/>
           </a:xfrm>
           <a:prstGeom prst="rect">
             <a:avLst/>
           </a:prstGeom>
-          <a:noFill/>
         </p:spPr>
-        <p:txBody>
-          <a:bodyPr wrap="none">
-            <a:spAutoFit/>
-          </a:bodyPr>
-          <a:lstStyle/>
-          <a:p>
-            <a:r>
-              <a:t>[Could not render image: onlot-dataflow.png]</a:t>
-            </a:r>
-          </a:p>
-        </p:txBody>
-      </p:sp>
+      </p:pic>
     </p:spTree>
   </p:cSld>
   <p:clrMapOvr>
@@ -3317,34 +3311,30 @@
           </a:p>
         </p:txBody>
       </p:sp>
-      <p:sp>
-        <p:nvSpPr>
-          <p:cNvPr id="3" name="TextBox 2"/>
-          <p:cNvSpPr txBox="1"/>
+      <p:pic>
+        <p:nvPicPr>
+          <p:cNvPr id="3" name="Picture 2" descr="onprod-dataflow.png"/>
+          <p:cNvPicPr>
+            <a:picLocks noChangeAspect="1"/>
+          </p:cNvPicPr>
           <p:nvPr/>
-        </p:nvSpPr>
+        </p:nvPicPr>
+        <p:blipFill>
+          <a:blip r:embed="rId2"/>
+          <a:stretch>
+            <a:fillRect/>
+          </a:stretch>
+        </p:blipFill>
         <p:spPr>
           <a:xfrm>
             <a:off x="457200" y="1097280"/>
-            <a:ext cx="8229600" cy="914400"/>
+            <a:ext cx="8229600" cy="7954698"/>
           </a:xfrm>
           <a:prstGeom prst="rect">
             <a:avLst/>
           </a:prstGeom>
-          <a:noFill/>
         </p:spPr>
-        <p:txBody>
-          <a:bodyPr wrap="none">
-            <a:spAutoFit/>
-          </a:bodyPr>
-          <a:lstStyle/>
-          <a:p>
-            <a:r>
-              <a:t>[Could not render image: onprod-dataflow.png]</a:t>
-            </a:r>
-          </a:p>
-        </p:txBody>
-      </p:sp>
+      </p:pic>
     </p:spTree>
   </p:cSld>
   <p:clrMapOvr>
@@ -3384,34 +3374,30 @@
           </a:p>
         </p:txBody>
       </p:sp>
-      <p:sp>
-        <p:nvSpPr>
-          <p:cNvPr id="3" name="TextBox 2"/>
-          <p:cNvSpPr txBox="1"/>
+      <p:pic>
+        <p:nvPicPr>
+          <p:cNvPr id="3" name="Picture 2" descr="onscribe-dataflow.png"/>
+          <p:cNvPicPr>
+            <a:picLocks noChangeAspect="1"/>
+          </p:cNvPicPr>
           <p:nvPr/>
-        </p:nvSpPr>
+        </p:nvPicPr>
+        <p:blipFill>
+          <a:blip r:embed="rId2"/>
+          <a:stretch>
+            <a:fillRect/>
+          </a:stretch>
+        </p:blipFill>
         <p:spPr>
           <a:xfrm>
             <a:off x="457200" y="1097280"/>
-            <a:ext cx="8229600" cy="914400"/>
+            <a:ext cx="8229600" cy="5880241"/>
           </a:xfrm>
           <a:prstGeom prst="rect">
             <a:avLst/>
           </a:prstGeom>
-          <a:noFill/>
         </p:spPr>
-        <p:txBody>
-          <a:bodyPr wrap="none">
-            <a:spAutoFit/>
-          </a:bodyPr>
-          <a:lstStyle/>
-          <a:p>
-            <a:r>
-              <a:t>[Could not render image: onscribe-dataflow.png]</a:t>
-            </a:r>
-          </a:p>
-        </p:txBody>
-      </p:sp>
+      </p:pic>
     </p:spTree>
   </p:cSld>
   <p:clrMapOvr>
@@ -3451,34 +3437,30 @@
           </a:p>
         </p:txBody>
       </p:sp>
-      <p:sp>
-        <p:nvSpPr>
-          <p:cNvPr id="3" name="TextBox 2"/>
-          <p:cNvSpPr txBox="1"/>
+      <p:pic>
+        <p:nvPicPr>
+          <p:cNvPr id="3" name="Picture 2" descr="onslice-dataflow.png"/>
+          <p:cNvPicPr>
+            <a:picLocks noChangeAspect="1"/>
+          </p:cNvPicPr>
           <p:nvPr/>
-        </p:nvSpPr>
+        </p:nvPicPr>
+        <p:blipFill>
+          <a:blip r:embed="rId2"/>
+          <a:stretch>
+            <a:fillRect/>
+          </a:stretch>
+        </p:blipFill>
         <p:spPr>
           <a:xfrm>
             <a:off x="457200" y="1097280"/>
-            <a:ext cx="8229600" cy="914400"/>
+            <a:ext cx="8229600" cy="4174202"/>
           </a:xfrm>
           <a:prstGeom prst="rect">
             <a:avLst/>
           </a:prstGeom>
-          <a:noFill/>
         </p:spPr>
-        <p:txBody>
-          <a:bodyPr wrap="none">
-            <a:spAutoFit/>
-          </a:bodyPr>
-          <a:lstStyle/>
-          <a:p>
-            <a:r>
-              <a:t>[Could not render image: onslice-dataflow.png]</a:t>
-            </a:r>
-          </a:p>
-        </p:txBody>
-      </p:sp>
+      </p:pic>
     </p:spTree>
   </p:cSld>
   <p:clrMapOvr>
@@ -3513,6 +3495,132 @@
           <a:lstStyle/>
           <a:p>
             <a:r>
+              <a:t>ONWMAP LEVEL2 CONFIG</a:t>
+            </a:r>
+          </a:p>
+        </p:txBody>
+      </p:sp>
+      <p:pic>
+        <p:nvPicPr>
+          <p:cNvPr id="3" name="Picture 2" descr="onwmap-level2-config.png"/>
+          <p:cNvPicPr>
+            <a:picLocks noChangeAspect="1"/>
+          </p:cNvPicPr>
+          <p:nvPr/>
+        </p:nvPicPr>
+        <p:blipFill>
+          <a:blip r:embed="rId2"/>
+          <a:stretch>
+            <a:fillRect/>
+          </a:stretch>
+        </p:blipFill>
+        <p:spPr>
+          <a:xfrm>
+            <a:off x="457200" y="1097280"/>
+            <a:ext cx="8229600" cy="33894299"/>
+          </a:xfrm>
+          <a:prstGeom prst="rect">
+            <a:avLst/>
+          </a:prstGeom>
+        </p:spPr>
+      </p:pic>
+    </p:spTree>
+  </p:cSld>
+  <p:clrMapOvr>
+    <a:masterClrMapping/>
+  </p:clrMapOvr>
+</p:sld>
+</file>
+
+<file path=ppt/slides/slide16.xml><?xml version="1.0" encoding="utf-8"?>
+<p:sld xmlns:a="http://schemas.openxmlformats.org/drawingml/2006/main" xmlns:p="http://schemas.openxmlformats.org/presentationml/2006/main" xmlns:r="http://schemas.openxmlformats.org/officeDocument/2006/relationships">
+  <p:cSld>
+    <p:spTree>
+      <p:nvGrpSpPr>
+        <p:cNvPr id="1" name=""/>
+        <p:cNvGrpSpPr/>
+        <p:nvPr/>
+      </p:nvGrpSpPr>
+      <p:grpSpPr/>
+      <p:sp>
+        <p:nvSpPr>
+          <p:cNvPr id="2" name="Title 1"/>
+          <p:cNvSpPr>
+            <a:spLocks noGrp="1"/>
+          </p:cNvSpPr>
+          <p:nvPr>
+            <p:ph type="title"/>
+          </p:nvPr>
+        </p:nvSpPr>
+        <p:spPr/>
+        <p:txBody>
+          <a:bodyPr/>
+          <a:lstStyle/>
+          <a:p>
+            <a:r>
+              <a:t>ONWMAP LEVEL2 PRODUCT</a:t>
+            </a:r>
+          </a:p>
+        </p:txBody>
+      </p:sp>
+      <p:pic>
+        <p:nvPicPr>
+          <p:cNvPr id="3" name="Picture 2" descr="onwmap-level2-product.png"/>
+          <p:cNvPicPr>
+            <a:picLocks noChangeAspect="1"/>
+          </p:cNvPicPr>
+          <p:nvPr/>
+        </p:nvPicPr>
+        <p:blipFill>
+          <a:blip r:embed="rId2"/>
+          <a:stretch>
+            <a:fillRect/>
+          </a:stretch>
+        </p:blipFill>
+        <p:spPr>
+          <a:xfrm>
+            <a:off x="457200" y="1097280"/>
+            <a:ext cx="8229600" cy="22164912"/>
+          </a:xfrm>
+          <a:prstGeom prst="rect">
+            <a:avLst/>
+          </a:prstGeom>
+        </p:spPr>
+      </p:pic>
+    </p:spTree>
+  </p:cSld>
+  <p:clrMapOvr>
+    <a:masterClrMapping/>
+  </p:clrMapOvr>
+</p:sld>
+</file>
+
+<file path=ppt/slides/slide17.xml><?xml version="1.0" encoding="utf-8"?>
+<p:sld xmlns:a="http://schemas.openxmlformats.org/drawingml/2006/main" xmlns:p="http://schemas.openxmlformats.org/presentationml/2006/main" xmlns:r="http://schemas.openxmlformats.org/officeDocument/2006/relationships">
+  <p:cSld>
+    <p:spTree>
+      <p:nvGrpSpPr>
+        <p:cNvPr id="1" name=""/>
+        <p:cNvGrpSpPr/>
+        <p:nvPr/>
+      </p:nvGrpSpPr>
+      <p:grpSpPr/>
+      <p:sp>
+        <p:nvSpPr>
+          <p:cNvPr id="2" name="Title 1"/>
+          <p:cNvSpPr>
+            <a:spLocks noGrp="1"/>
+          </p:cNvSpPr>
+          <p:nvPr>
+            <p:ph type="title"/>
+          </p:nvPr>
+        </p:nvSpPr>
+        <p:spPr/>
+        <p:txBody>
+          <a:bodyPr/>
+          <a:lstStyle/>
+          <a:p>
+            <a:r>
               <a:t>Databricks Migration: Summary</a:t>
             </a:r>
           </a:p>
@@ -3632,7 +3740,7 @@
               <a:defRPr sz="1800"/>
             </a:pPr>
             <a:r>
-              <a:t>Key flows: OnLot / OnProd / OnScribe / OnSlice</a:t>
+              <a:t>Key flows: OnLot / OnProd / OnScribe / OnSlice / OnWmap</a:t>
             </a:r>
           </a:p>
           <a:p>

</xml_diff>